<commit_message>
osi rework, bus far ahead
</commit_message>
<xml_diff>
--- a/docs/abbildungen/20160307_Vorgänge.pptx
+++ b/docs/abbildungen/20160307_Vorgänge.pptx
@@ -200,7 +200,7 @@
           <a:p>
             <a:fld id="{5753CF93-5E45-3941-8549-3B143DEE3F14}" type="datetimeFigureOut">
               <a:rPr lang="de-DE" smtClean="0"/>
-              <a:t>10.03.16</a:t>
+              <a:t>11.03.16</a:t>
             </a:fld>
             <a:endParaRPr lang="de-DE"/>
           </a:p>
@@ -414,7 +414,7 @@
           <a:p>
             <a:fld id="{CAD28D52-5B67-8840-9FB3-766E3199C55A}" type="datetimeFigureOut">
               <a:rPr lang="de-DE" smtClean="0"/>
-              <a:t>10.03.16</a:t>
+              <a:t>11.03.16</a:t>
             </a:fld>
             <a:endParaRPr lang="de-DE"/>
           </a:p>
@@ -584,7 +584,7 @@
           <a:p>
             <a:fld id="{CAD28D52-5B67-8840-9FB3-766E3199C55A}" type="datetimeFigureOut">
               <a:rPr lang="de-DE" smtClean="0"/>
-              <a:t>10.03.16</a:t>
+              <a:t>11.03.16</a:t>
             </a:fld>
             <a:endParaRPr lang="de-DE"/>
           </a:p>
@@ -764,7 +764,7 @@
           <a:p>
             <a:fld id="{CAD28D52-5B67-8840-9FB3-766E3199C55A}" type="datetimeFigureOut">
               <a:rPr lang="de-DE" smtClean="0"/>
-              <a:t>10.03.16</a:t>
+              <a:t>11.03.16</a:t>
             </a:fld>
             <a:endParaRPr lang="de-DE"/>
           </a:p>
@@ -934,7 +934,7 @@
           <a:p>
             <a:fld id="{CAD28D52-5B67-8840-9FB3-766E3199C55A}" type="datetimeFigureOut">
               <a:rPr lang="de-DE" smtClean="0"/>
-              <a:t>10.03.16</a:t>
+              <a:t>11.03.16</a:t>
             </a:fld>
             <a:endParaRPr lang="de-DE"/>
           </a:p>
@@ -1180,7 +1180,7 @@
           <a:p>
             <a:fld id="{CAD28D52-5B67-8840-9FB3-766E3199C55A}" type="datetimeFigureOut">
               <a:rPr lang="de-DE" smtClean="0"/>
-              <a:t>10.03.16</a:t>
+              <a:t>11.03.16</a:t>
             </a:fld>
             <a:endParaRPr lang="de-DE"/>
           </a:p>
@@ -1412,7 +1412,7 @@
           <a:p>
             <a:fld id="{CAD28D52-5B67-8840-9FB3-766E3199C55A}" type="datetimeFigureOut">
               <a:rPr lang="de-DE" smtClean="0"/>
-              <a:t>10.03.16</a:t>
+              <a:t>11.03.16</a:t>
             </a:fld>
             <a:endParaRPr lang="de-DE"/>
           </a:p>
@@ -1779,7 +1779,7 @@
           <a:p>
             <a:fld id="{CAD28D52-5B67-8840-9FB3-766E3199C55A}" type="datetimeFigureOut">
               <a:rPr lang="de-DE" smtClean="0"/>
-              <a:t>10.03.16</a:t>
+              <a:t>11.03.16</a:t>
             </a:fld>
             <a:endParaRPr lang="de-DE"/>
           </a:p>
@@ -1897,7 +1897,7 @@
           <a:p>
             <a:fld id="{CAD28D52-5B67-8840-9FB3-766E3199C55A}" type="datetimeFigureOut">
               <a:rPr lang="de-DE" smtClean="0"/>
-              <a:t>10.03.16</a:t>
+              <a:t>11.03.16</a:t>
             </a:fld>
             <a:endParaRPr lang="de-DE"/>
           </a:p>
@@ -1992,7 +1992,7 @@
           <a:p>
             <a:fld id="{CAD28D52-5B67-8840-9FB3-766E3199C55A}" type="datetimeFigureOut">
               <a:rPr lang="de-DE" smtClean="0"/>
-              <a:t>10.03.16</a:t>
+              <a:t>11.03.16</a:t>
             </a:fld>
             <a:endParaRPr lang="de-DE"/>
           </a:p>
@@ -2269,7 +2269,7 @@
           <a:p>
             <a:fld id="{CAD28D52-5B67-8840-9FB3-766E3199C55A}" type="datetimeFigureOut">
               <a:rPr lang="de-DE" smtClean="0"/>
-              <a:t>10.03.16</a:t>
+              <a:t>11.03.16</a:t>
             </a:fld>
             <a:endParaRPr lang="de-DE"/>
           </a:p>
@@ -2522,7 +2522,7 @@
           <a:p>
             <a:fld id="{CAD28D52-5B67-8840-9FB3-766E3199C55A}" type="datetimeFigureOut">
               <a:rPr lang="de-DE" smtClean="0"/>
-              <a:t>10.03.16</a:t>
+              <a:t>11.03.16</a:t>
             </a:fld>
             <a:endParaRPr lang="de-DE"/>
           </a:p>
@@ -2735,7 +2735,7 @@
           <a:p>
             <a:fld id="{CAD28D52-5B67-8840-9FB3-766E3199C55A}" type="datetimeFigureOut">
               <a:rPr lang="de-DE" smtClean="0"/>
-              <a:t>10.03.16</a:t>
+              <a:t>11.03.16</a:t>
             </a:fld>
             <a:endParaRPr lang="de-DE"/>
           </a:p>
@@ -3617,11 +3617,6 @@
                 </a:rPr>
                 <a:t>Service User</a:t>
               </a:r>
-              <a:endParaRPr lang="de-DE" b="1" dirty="0">
-                <a:latin typeface="Avenir Black" charset="0"/>
-                <a:ea typeface="Avenir Black" charset="0"/>
-                <a:cs typeface="Avenir Black" charset="0"/>
-              </a:endParaRPr>
             </a:p>
           </p:txBody>
         </p:sp>
@@ -3849,10 +3844,10 @@
           </p:nvGrpSpPr>
           <p:grpSpPr>
             <a:xfrm>
-              <a:off x="5939097" y="4248706"/>
-              <a:ext cx="1883942" cy="449179"/>
-              <a:chOff x="5921131" y="3321796"/>
-              <a:chExt cx="1883942" cy="449179"/>
+              <a:off x="4126617" y="4248706"/>
+              <a:ext cx="1800000" cy="449179"/>
+              <a:chOff x="4108651" y="3321796"/>
+              <a:chExt cx="1800000" cy="449179"/>
             </a:xfrm>
           </p:grpSpPr>
           <p:sp>
@@ -3863,7 +3858,7 @@
             </p:nvSpPr>
             <p:spPr>
               <a:xfrm>
-                <a:off x="6551204" y="3321796"/>
+                <a:off x="4559105" y="3321796"/>
                 <a:ext cx="1253869" cy="369332"/>
               </a:xfrm>
               <a:prstGeom prst="rect">
@@ -3901,7 +3896,7 @@
             </p:nvCxnSpPr>
             <p:spPr>
               <a:xfrm flipH="1">
-                <a:off x="5921131" y="3770975"/>
+                <a:off x="4108651" y="3770975"/>
                 <a:ext cx="1800000" cy="0"/>
               </a:xfrm>
               <a:prstGeom prst="straightConnector1">
@@ -3938,10 +3933,10 @@
           </p:nvGrpSpPr>
           <p:grpSpPr>
             <a:xfrm>
-              <a:off x="5939097" y="4933885"/>
-              <a:ext cx="2063158" cy="450806"/>
-              <a:chOff x="5921131" y="4474893"/>
-              <a:chExt cx="2063158" cy="450806"/>
+              <a:off x="4126617" y="4933885"/>
+              <a:ext cx="1883539" cy="450806"/>
+              <a:chOff x="4108651" y="4474893"/>
+              <a:chExt cx="1883539" cy="450806"/>
             </a:xfrm>
           </p:grpSpPr>
           <p:sp>
@@ -3952,7 +3947,7 @@
             </p:nvSpPr>
             <p:spPr>
               <a:xfrm>
-                <a:off x="6371988" y="4474893"/>
+                <a:off x="4379889" y="4474893"/>
                 <a:ext cx="1612301" cy="369332"/>
               </a:xfrm>
               <a:prstGeom prst="rect">
@@ -3998,7 +3993,7 @@
             </p:nvCxnSpPr>
             <p:spPr>
               <a:xfrm flipH="1">
-                <a:off x="5921131" y="4925699"/>
+                <a:off x="4108651" y="4925699"/>
                 <a:ext cx="1800000" cy="0"/>
               </a:xfrm>
               <a:prstGeom prst="straightConnector1">
@@ -4030,7 +4025,7 @@
       </p:grpSp>
       <p:pic>
         <p:nvPicPr>
-          <p:cNvPr id="62" name="Bild 61"/>
+          <p:cNvPr id="2" name="Bild 1"/>
           <p:cNvPicPr>
             <a:picLocks noChangeAspect="1"/>
           </p:cNvPicPr>

</xml_diff>